<commit_message>
Minor fixes on color palettes slides
</commit_message>
<xml_diff>
--- a/Courses/Computer-Modeling-and-IT/Computer-Modeling-and-IT-5-Class/12-Colour-Palettes/12-Colour-Palettes.pptx
+++ b/Courses/Computer-Modeling-and-IT/Computer-Modeling-and-IT-5-Class/12-Colour-Palettes/12-Colour-Palettes.pptx
@@ -287,7 +287,7 @@
           <a:p>
             <a:fld id="{4E087215-0C8F-4762-A664-737A353EC9A4}" type="datetimeFigureOut">
               <a:rPr lang="bg-BG" smtClean="0"/>
-              <a:t>26.10.2023 г.</a:t>
+              <a:t>31.10.23 г.</a:t>
             </a:fld>
             <a:endParaRPr lang="bg-BG"/>
           </a:p>
@@ -483,7 +483,7 @@
           <a:p>
             <a:fld id="{72D84649-876A-46C9-8472-14CB09C070D8}" type="datetimeFigureOut">
               <a:rPr lang="en-US" smtClean="0"/>
-              <a:t>10/26/2023</a:t>
+              <a:t>10/31/23</a:t>
             </a:fld>
             <a:endParaRPr lang="en-US"/>
           </a:p>
@@ -4223,7 +4223,7 @@
             <a:fld id="{055373AC-9AA7-423B-BA00-BA1C74164DBD}" type="datetime1">
               <a:rPr lang="en-US" smtClean="0"/>
               <a:pPr/>
-              <a:t>10/26/2023</a:t>
+              <a:t>10/31/23</a:t>
             </a:fld>
             <a:endParaRPr lang="en-US" dirty="0"/>
           </a:p>
@@ -7533,7 +7533,7 @@
           <a:lstStyle/>
           <a:p>
             <a:r>
-              <a:rPr lang="bg-BG" dirty="0" smtClean="0"/>
+              <a:rPr lang="bg-BG" dirty="0"/>
               <a:t>Избор на цвят и оцветяване на контур графично изображение</a:t>
             </a:r>
             <a:endParaRPr lang="en-US" dirty="0"/>
@@ -7569,12 +7569,8 @@
           <a:lstStyle/>
           <a:p>
             <a:r>
-              <a:rPr lang="bg-BG" dirty="0" smtClean="0"/>
-              <a:t>Цветови </a:t>
-            </a:r>
-            <a:r>
               <a:rPr lang="bg-BG" dirty="0"/>
-              <a:t>палитри</a:t>
+              <a:t>Цветови палитри</a:t>
             </a:r>
             <a:endParaRPr lang="en-US" dirty="0"/>
           </a:p>
@@ -7596,14 +7592,13 @@
               </a:ext>
             </a:extLst>
           </a:blip>
-          <a:stretch>
-            <a:fillRect/>
-          </a:stretch>
+          <a:srcRect/>
+          <a:stretch/>
         </p:blipFill>
         <p:spPr>
           <a:xfrm>
-            <a:off x="554746" y="3024977"/>
-            <a:ext cx="1769683" cy="825597"/>
+            <a:off x="554746" y="3040926"/>
+            <a:ext cx="1769683" cy="793699"/>
           </a:xfrm>
           <a:prstGeom prst="rect">
             <a:avLst/>
@@ -7727,13 +7722,6 @@
       <p:transition spd="slow" advClick="0" advTm="5000"/>
     </mc:Fallback>
   </mc:AlternateContent>
-  <p:timing>
-    <p:tnLst>
-      <p:par>
-        <p:cTn id="1" dur="indefinite" restart="never" nodeType="tmRoot"/>
-      </p:par>
-    </p:tnLst>
-  </p:timing>
 </p:sld>
 </file>
 
@@ -7791,7 +7779,7 @@
         <p:spPr>
           <a:xfrm>
             <a:off x="190402" y="1196125"/>
-            <a:ext cx="6895598" cy="5528766"/>
+            <a:ext cx="7480598" cy="5528766"/>
           </a:xfrm>
         </p:spPr>
         <p:txBody>
@@ -7799,11 +7787,11 @@
           <a:lstStyle/>
           <a:p>
             <a:r>
-              <a:rPr lang="bg-BG" b="1" dirty="0" smtClean="0"/>
+              <a:rPr lang="bg-BG" b="1" dirty="0"/>
               <a:t>Бутон </a:t>
             </a:r>
             <a:r>
-              <a:rPr lang="en-US" b="1" dirty="0" smtClean="0">
+              <a:rPr lang="en-US" b="1" dirty="0">
                 <a:solidFill>
                   <a:schemeClr val="bg1"/>
                 </a:solidFill>
@@ -7811,19 +7799,19 @@
               <a:t>Undo</a:t>
             </a:r>
             <a:r>
-              <a:rPr lang="en-US" b="1" dirty="0" smtClean="0"/>
+              <a:rPr lang="en-US" b="1" dirty="0"/>
               <a:t> </a:t>
             </a:r>
             <a:r>
-              <a:rPr lang="en-US" dirty="0" smtClean="0"/>
+              <a:rPr lang="en-US" dirty="0"/>
               <a:t>– </a:t>
             </a:r>
             <a:r>
-              <a:rPr lang="bg-BG" b="1" dirty="0" smtClean="0"/>
+              <a:rPr lang="bg-BG" b="1" dirty="0"/>
               <a:t>възвръщане</a:t>
             </a:r>
             <a:r>
-              <a:rPr lang="bg-BG" dirty="0" smtClean="0"/>
+              <a:rPr lang="bg-BG" dirty="0"/>
               <a:t> на </a:t>
             </a:r>
             <a:r>
@@ -7835,11 +7823,11 @@
               <a:t> </a:t>
             </a:r>
             <a:r>
-              <a:rPr lang="bg-BG" b="1" dirty="0" smtClean="0"/>
+              <a:rPr lang="bg-BG" b="1" dirty="0"/>
               <a:t>състояние</a:t>
             </a:r>
             <a:r>
-              <a:rPr lang="bg-BG" dirty="0" smtClean="0"/>
+              <a:rPr lang="bg-BG" dirty="0"/>
               <a:t> на рисунката</a:t>
             </a:r>
           </a:p>
@@ -7847,13 +7835,13 @@
             <a:pPr marL="0" indent="0">
               <a:buNone/>
             </a:pPr>
-            <a:endParaRPr lang="bg-BG" dirty="0" smtClean="0"/>
+            <a:endParaRPr lang="bg-BG" dirty="0"/>
           </a:p>
           <a:p>
             <a:pPr marL="0" indent="0">
               <a:buNone/>
             </a:pPr>
-            <a:endParaRPr lang="en-US" dirty="0" smtClean="0"/>
+            <a:endParaRPr lang="en-US" dirty="0"/>
           </a:p>
           <a:p>
             <a:pPr>
@@ -7862,11 +7850,11 @@
               </a:spcBef>
             </a:pPr>
             <a:r>
-              <a:rPr lang="bg-BG" b="1" dirty="0" smtClean="0"/>
+              <a:rPr lang="bg-BG" b="1" dirty="0"/>
               <a:t>Бутон </a:t>
             </a:r>
             <a:r>
-              <a:rPr lang="en-US" b="1" dirty="0" smtClean="0">
+              <a:rPr lang="en-US" b="1" dirty="0">
                 <a:solidFill>
                   <a:schemeClr val="bg1"/>
                 </a:solidFill>
@@ -7874,33 +7862,33 @@
               <a:t>Redo</a:t>
             </a:r>
             <a:r>
-              <a:rPr lang="en-US" b="1" dirty="0" smtClean="0"/>
+              <a:rPr lang="en-US" b="1" dirty="0"/>
               <a:t> </a:t>
             </a:r>
             <a:r>
-              <a:rPr lang="en-US" dirty="0" smtClean="0"/>
+              <a:rPr lang="en-US" dirty="0"/>
               <a:t>– </a:t>
             </a:r>
             <a:r>
-              <a:rPr lang="bg-BG" b="1" dirty="0" smtClean="0"/>
+              <a:rPr lang="bg-BG" b="1" dirty="0"/>
               <a:t>отново</a:t>
             </a:r>
             <a:r>
-              <a:rPr lang="bg-BG" dirty="0" smtClean="0"/>
-              <a:t> възвръщате </a:t>
-            </a:r>
-            <a:r>
-              <a:rPr lang="bg-BG" b="1" dirty="0" smtClean="0"/>
+              <a:rPr lang="bg-BG" dirty="0"/>
+              <a:t> възвръщане на </a:t>
+            </a:r>
+            <a:r>
+              <a:rPr lang="bg-BG" b="1" dirty="0"/>
               <a:t>предното състояние </a:t>
             </a:r>
             <a:r>
-              <a:rPr lang="bg-BG" dirty="0" smtClean="0"/>
+              <a:rPr lang="bg-BG" dirty="0"/>
               <a:t>на рисунката</a:t>
             </a:r>
-            <a:endParaRPr lang="en-US" dirty="0" smtClean="0"/>
-          </a:p>
-          <a:p>
-            <a:endParaRPr lang="bg-BG" dirty="0" smtClean="0"/>
+            <a:endParaRPr lang="en-US" dirty="0"/>
+          </a:p>
+          <a:p>
+            <a:endParaRPr lang="bg-BG" dirty="0"/>
           </a:p>
         </p:txBody>
       </p:sp>
@@ -7920,10 +7908,9 @@
           <a:lstStyle/>
           <a:p>
             <a:r>
-              <a:rPr lang="en-US" dirty="0" smtClean="0"/>
+              <a:rPr lang="en-US" dirty="0"/>
               <a:t>Undo &amp; Redo</a:t>
             </a:r>
-            <a:endParaRPr lang="en-US" dirty="0"/>
           </a:p>
         </p:txBody>
       </p:sp>
@@ -8176,19 +8163,19 @@
           <a:lstStyle/>
           <a:p>
             <a:r>
-              <a:rPr lang="bg-BG" dirty="0" smtClean="0"/>
+              <a:rPr lang="bg-BG" dirty="0"/>
               <a:t>Отворете </a:t>
             </a:r>
             <a:r>
-              <a:rPr lang="bg-BG" b="1" dirty="0" smtClean="0"/>
+              <a:rPr lang="bg-BG" b="1" dirty="0"/>
               <a:t>файла</a:t>
             </a:r>
             <a:r>
-              <a:rPr lang="bg-BG" dirty="0" smtClean="0"/>
+              <a:rPr lang="bg-BG" dirty="0"/>
               <a:t> </a:t>
             </a:r>
             <a:r>
-              <a:rPr lang="en-US" b="1" dirty="0" smtClean="0">
+              <a:rPr lang="en-US" b="1" dirty="0">
                 <a:solidFill>
                   <a:schemeClr val="bg1"/>
                 </a:solidFill>
@@ -8196,35 +8183,35 @@
               <a:t>kushta.png</a:t>
             </a:r>
             <a:r>
-              <a:rPr lang="en-US" dirty="0" smtClean="0"/>
+              <a:rPr lang="en-US" dirty="0"/>
               <a:t> </a:t>
             </a:r>
             <a:r>
-              <a:rPr lang="bg-BG" dirty="0" smtClean="0"/>
+              <a:rPr lang="bg-BG" dirty="0"/>
               <a:t>и </a:t>
             </a:r>
             <a:r>
-              <a:rPr lang="bg-BG" b="1" dirty="0" smtClean="0"/>
+              <a:rPr lang="bg-BG" b="1" dirty="0"/>
               <a:t>оцветете</a:t>
             </a:r>
             <a:r>
-              <a:rPr lang="bg-BG" dirty="0" smtClean="0"/>
+              <a:rPr lang="bg-BG" dirty="0"/>
               <a:t> </a:t>
             </a:r>
             <a:r>
-              <a:rPr lang="bg-BG" b="1" dirty="0" smtClean="0"/>
+              <a:rPr lang="bg-BG" b="1" dirty="0"/>
               <a:t>картината</a:t>
             </a:r>
             <a:r>
-              <a:rPr lang="bg-BG" dirty="0" smtClean="0"/>
+              <a:rPr lang="bg-BG" dirty="0"/>
               <a:t> с </a:t>
             </a:r>
             <a:r>
-              <a:rPr lang="bg-BG" b="1" dirty="0" smtClean="0"/>
+              <a:rPr lang="bg-BG" b="1" dirty="0"/>
               <a:t>подходящи</a:t>
             </a:r>
             <a:r>
-              <a:rPr lang="bg-BG" dirty="0" smtClean="0"/>
+              <a:rPr lang="bg-BG" dirty="0"/>
               <a:t> цветове</a:t>
             </a:r>
             <a:endParaRPr lang="en-US" dirty="0"/>
@@ -8247,7 +8234,7 @@
           <a:lstStyle/>
           <a:p>
             <a:r>
-              <a:rPr lang="bg-BG" dirty="0" smtClean="0"/>
+              <a:rPr lang="bg-BG" dirty="0"/>
               <a:t>Задача: Оцветяване</a:t>
             </a:r>
             <a:endParaRPr lang="en-US" dirty="0"/>
@@ -8302,13 +8289,6 @@
       <p:transition spd="slow" advClick="0" advTm="5000"/>
     </mc:Fallback>
   </mc:AlternateContent>
-  <p:timing>
-    <p:tnLst>
-      <p:par>
-        <p:cTn id="1" dur="indefinite" restart="never" nodeType="tmRoot"/>
-      </p:par>
-    </p:tnLst>
-  </p:timing>
 </p:sld>
 </file>
 
@@ -8351,11 +8331,7 @@
           <a:p>
             <a:r>
               <a:rPr lang="bg-BG" dirty="0"/>
-              <a:t>Създаване на собствен </a:t>
-            </a:r>
-            <a:r>
-              <a:rPr lang="bg-BG" dirty="0" smtClean="0"/>
-              <a:t>цвят</a:t>
+              <a:t>Създаване на собствен цвят</a:t>
             </a:r>
             <a:endParaRPr lang="en-US" dirty="0"/>
           </a:p>
@@ -8441,13 +8417,6 @@
       <p:transition spd="slow" advClick="0" advTm="5000"/>
     </mc:Fallback>
   </mc:AlternateContent>
-  <p:timing>
-    <p:tnLst>
-      <p:par>
-        <p:cTn id="1" dur="indefinite" restart="never" nodeType="tmRoot"/>
-      </p:par>
-    </p:tnLst>
-  </p:timing>
 </p:sld>
 </file>
 
@@ -8484,11 +8453,11 @@
           <a:lstStyle/>
           <a:p>
             <a:r>
-              <a:rPr lang="bg-BG" b="1" dirty="0" smtClean="0"/>
+              <a:rPr lang="bg-BG" b="1" dirty="0"/>
               <a:t>Програмата </a:t>
             </a:r>
             <a:r>
-              <a:rPr lang="en-US" b="1" dirty="0" smtClean="0">
+              <a:rPr lang="en-US" b="1" dirty="0">
                 <a:solidFill>
                   <a:schemeClr val="bg1"/>
                 </a:solidFill>
@@ -8496,45 +8465,45 @@
               <a:t>Paint</a:t>
             </a:r>
             <a:r>
-              <a:rPr lang="en-US" b="1" dirty="0" smtClean="0"/>
+              <a:rPr lang="en-US" b="1" dirty="0"/>
               <a:t> </a:t>
             </a:r>
             <a:r>
-              <a:rPr lang="bg-BG" dirty="0" smtClean="0"/>
+              <a:rPr lang="bg-BG" dirty="0"/>
               <a:t>дава възможност сами да </a:t>
             </a:r>
             <a:r>
-              <a:rPr lang="bg-BG" b="1" dirty="0" smtClean="0"/>
-              <a:t>създадете</a:t>
-            </a:r>
-            <a:r>
-              <a:rPr lang="bg-BG" dirty="0" smtClean="0"/>
+              <a:rPr lang="bg-BG" b="1" dirty="0"/>
+              <a:t>създадем</a:t>
+            </a:r>
+            <a:r>
+              <a:rPr lang="bg-BG" dirty="0"/>
               <a:t> </a:t>
             </a:r>
             <a:r>
-              <a:rPr lang="bg-BG" b="1" dirty="0" smtClean="0"/>
+              <a:rPr lang="bg-BG" b="1" dirty="0"/>
               <a:t>нужните</a:t>
             </a:r>
             <a:r>
-              <a:rPr lang="bg-BG" dirty="0" smtClean="0"/>
-              <a:t> за вас </a:t>
-            </a:r>
-            <a:r>
-              <a:rPr lang="bg-BG" b="1" dirty="0" smtClean="0"/>
+              <a:rPr lang="bg-BG" dirty="0"/>
+              <a:t> за нас </a:t>
+            </a:r>
+            <a:r>
+              <a:rPr lang="bg-BG" b="1" dirty="0"/>
               <a:t>цветове</a:t>
             </a:r>
           </a:p>
           <a:p>
             <a:r>
-              <a:rPr lang="bg-BG" dirty="0" smtClean="0"/>
+              <a:rPr lang="bg-BG" dirty="0"/>
               <a:t>За целта трябва да натиснем </a:t>
             </a:r>
             <a:r>
-              <a:rPr lang="bg-BG" b="1" dirty="0" smtClean="0"/>
+              <a:rPr lang="bg-BG" b="1" dirty="0"/>
               <a:t>бутона </a:t>
             </a:r>
             <a:r>
-              <a:rPr lang="en-US" b="1" dirty="0" smtClean="0">
+              <a:rPr lang="en-US" b="1" dirty="0">
                 <a:solidFill>
                   <a:schemeClr val="bg1"/>
                 </a:solidFill>
@@ -8542,26 +8511,21 @@
               <a:t>Edit Colors </a:t>
             </a:r>
             <a:r>
-              <a:rPr lang="bg-BG" dirty="0" smtClean="0"/>
+              <a:rPr lang="bg-BG" dirty="0"/>
               <a:t>от </a:t>
             </a:r>
             <a:r>
-              <a:rPr lang="bg-BG" b="1" dirty="0" smtClean="0"/>
+              <a:rPr lang="bg-BG" b="1" dirty="0"/>
               <a:t>панела </a:t>
             </a:r>
             <a:r>
-              <a:rPr lang="en-US" b="1" dirty="0" smtClean="0">
+              <a:rPr lang="en-US" b="1" dirty="0">
                 <a:solidFill>
                   <a:schemeClr val="bg1"/>
                 </a:solidFill>
               </a:rPr>
               <a:t>Colors</a:t>
             </a:r>
-            <a:endParaRPr lang="en-US" b="1" dirty="0">
-              <a:solidFill>
-                <a:schemeClr val="bg1"/>
-              </a:solidFill>
-            </a:endParaRPr>
           </a:p>
         </p:txBody>
       </p:sp>
@@ -8581,7 +8545,7 @@
           <a:lstStyle/>
           <a:p>
             <a:r>
-              <a:rPr lang="bg-BG" dirty="0" smtClean="0"/>
+              <a:rPr lang="bg-BG" dirty="0"/>
               <a:t>Собствен цвят</a:t>
             </a:r>
             <a:endParaRPr lang="en-US" dirty="0"/>
@@ -8934,7 +8898,7 @@
           <a:lstStyle/>
           <a:p>
             <a:r>
-              <a:rPr lang="bg-BG" dirty="0" smtClean="0"/>
+              <a:rPr lang="bg-BG" dirty="0"/>
               <a:t>Създаване на собствен цвят (1)</a:t>
             </a:r>
             <a:endParaRPr lang="en-US" dirty="0"/>
@@ -9104,7 +9068,7 @@
           <a:p>
             <a:pPr algn="ctr"/>
             <a:r>
-              <a:rPr lang="bg-BG" sz="2800" b="1" dirty="0" smtClean="0">
+              <a:rPr lang="bg-BG" sz="2800" b="1" dirty="0">
                 <a:solidFill>
                   <a:srgbClr val="FFFFFF"/>
                 </a:solidFill>
@@ -9259,7 +9223,7 @@
           <a:p>
             <a:pPr algn="ctr"/>
             <a:r>
-              <a:rPr lang="bg-BG" sz="2800" b="1" dirty="0" smtClean="0">
+              <a:rPr lang="bg-BG" sz="2800" b="1" dirty="0">
                 <a:solidFill>
                   <a:srgbClr val="FFFFFF"/>
                 </a:solidFill>
@@ -9414,7 +9378,7 @@
           <a:p>
             <a:pPr algn="ctr"/>
             <a:r>
-              <a:rPr lang="bg-BG" sz="2800" b="1" dirty="0" smtClean="0">
+              <a:rPr lang="bg-BG" sz="2800" b="1" dirty="0">
                 <a:solidFill>
                   <a:srgbClr val="FFFFFF"/>
                 </a:solidFill>
@@ -9830,11 +9794,7 @@
           <a:p>
             <a:r>
               <a:rPr lang="bg-BG" dirty="0"/>
-              <a:t>Създаване на собствен цвят </a:t>
-            </a:r>
-            <a:r>
-              <a:rPr lang="bg-BG" dirty="0" smtClean="0"/>
-              <a:t>(2)</a:t>
+              <a:t>Създаване на собствен цвят (2)</a:t>
             </a:r>
             <a:endParaRPr lang="en-US" dirty="0"/>
           </a:p>
@@ -9937,7 +9897,7 @@
           <a:p>
             <a:pPr algn="ctr"/>
             <a:r>
-              <a:rPr lang="bg-BG" sz="2800" b="1" dirty="0" smtClean="0">
+              <a:rPr lang="bg-BG" sz="2800" b="1" dirty="0">
                 <a:solidFill>
                   <a:srgbClr val="FFFFFF"/>
                 </a:solidFill>
@@ -9952,7 +9912,7 @@
               <a:t>След като сте достигнали до желания цвят, натискате бутона </a:t>
             </a:r>
             <a:r>
-              <a:rPr lang="en-US" sz="2800" b="1" dirty="0" smtClean="0">
+              <a:rPr lang="en-US" sz="2800" b="1" dirty="0">
                 <a:solidFill>
                   <a:schemeClr val="bg1">
                     <a:lumMod val="60000"/>
@@ -9970,7 +9930,7 @@
               <a:t>Add to Custom Colors</a:t>
             </a:r>
             <a:r>
-              <a:rPr lang="bg-BG" sz="2800" b="1" dirty="0" smtClean="0">
+              <a:rPr lang="bg-BG" sz="2800" b="1" dirty="0">
                 <a:solidFill>
                   <a:srgbClr val="FFFFFF"/>
                 </a:solidFill>
@@ -10160,34 +10120,29 @@
           <a:lstStyle/>
           <a:p>
             <a:r>
-              <a:rPr lang="bg-BG" dirty="0" smtClean="0"/>
+              <a:rPr lang="bg-BG" dirty="0"/>
               <a:t>Създайте </a:t>
             </a:r>
             <a:r>
-              <a:rPr lang="bg-BG" b="1" dirty="0" smtClean="0"/>
+              <a:rPr lang="bg-BG" b="1" dirty="0"/>
               <a:t>3 собствени цвята </a:t>
             </a:r>
             <a:r>
-              <a:rPr lang="bg-BG" dirty="0" smtClean="0"/>
+              <a:rPr lang="bg-BG" dirty="0"/>
               <a:t>с помощта на </a:t>
             </a:r>
             <a:r>
-              <a:rPr lang="bg-BG" b="1" dirty="0" smtClean="0"/>
+              <a:rPr lang="bg-BG" b="1" dirty="0"/>
               <a:t>програмата </a:t>
             </a:r>
             <a:r>
-              <a:rPr lang="en-US" b="1" dirty="0" smtClean="0">
+              <a:rPr lang="en-US" b="1" dirty="0">
                 <a:solidFill>
                   <a:schemeClr val="bg1"/>
                 </a:solidFill>
               </a:rPr>
               <a:t>Paint</a:t>
             </a:r>
-            <a:endParaRPr lang="en-US" b="1" dirty="0">
-              <a:solidFill>
-                <a:schemeClr val="bg1"/>
-              </a:solidFill>
-            </a:endParaRPr>
           </a:p>
         </p:txBody>
       </p:sp>
@@ -10207,7 +10162,7 @@
           <a:lstStyle/>
           <a:p>
             <a:r>
-              <a:rPr lang="bg-BG" dirty="0" smtClean="0"/>
+              <a:rPr lang="bg-BG" dirty="0"/>
               <a:t>Задача: Собствени цветове</a:t>
             </a:r>
             <a:endParaRPr lang="en-US" dirty="0"/>
@@ -10261,13 +10216,6 @@
       <p:transition spd="slow" advClick="0" advTm="5000"/>
     </mc:Fallback>
   </mc:AlternateContent>
-  <p:timing>
-    <p:tnLst>
-      <p:par>
-        <p:cTn id="1" dur="indefinite" restart="never" nodeType="tmRoot"/>
-      </p:par>
-    </p:tnLst>
-  </p:timing>
 </p:sld>
 </file>
 
@@ -10930,148 +10878,148 @@
             </a:lvl9pPr>
           </a:lstStyle>
           <a:p>
+            <a:pPr marL="450000">
+              <a:buClr>
+                <a:schemeClr val="bg2"/>
+              </a:buClr>
+            </a:pPr>
+            <a:r>
+              <a:rPr lang="en-US" sz="3200" b="1" dirty="0">
+                <a:solidFill>
+                  <a:srgbClr val="FF0000"/>
+                </a:solidFill>
+              </a:rPr>
+              <a:t>R</a:t>
+            </a:r>
+            <a:r>
+              <a:rPr lang="en-US" sz="3200" b="1" dirty="0">
+                <a:solidFill>
+                  <a:schemeClr val="accent2"/>
+                </a:solidFill>
+              </a:rPr>
+              <a:t>G</a:t>
+            </a:r>
+            <a:r>
+              <a:rPr lang="en-US" sz="3200" b="1" dirty="0">
+                <a:solidFill>
+                  <a:schemeClr val="accent3"/>
+                </a:solidFill>
+              </a:rPr>
+              <a:t>B</a:t>
+            </a:r>
+            <a:r>
+              <a:rPr lang="en-US" sz="3200" dirty="0">
+                <a:solidFill>
+                  <a:schemeClr val="accent3"/>
+                </a:solidFill>
+              </a:rPr>
+              <a:t> </a:t>
+            </a:r>
+            <a:r>
+              <a:rPr lang="bg-BG" sz="3200" b="1" dirty="0">
+                <a:solidFill>
+                  <a:schemeClr val="bg2"/>
+                </a:solidFill>
+              </a:rPr>
+              <a:t>модел </a:t>
+            </a:r>
+            <a:r>
+              <a:rPr lang="bg-BG" sz="3200" dirty="0">
+                <a:solidFill>
+                  <a:schemeClr val="bg2"/>
+                </a:solidFill>
+              </a:rPr>
+              <a:t>–</a:t>
+            </a:r>
+            <a:r>
+              <a:rPr lang="en-US" sz="3200" dirty="0">
+                <a:solidFill>
+                  <a:schemeClr val="bg2"/>
+                </a:solidFill>
+              </a:rPr>
+              <a:t> </a:t>
+            </a:r>
+            <a:r>
+              <a:rPr lang="bg-BG" sz="3200" b="1" dirty="0">
+                <a:solidFill>
+                  <a:schemeClr val="bg2"/>
+                </a:solidFill>
+              </a:rPr>
+              <a:t>създаване</a:t>
+            </a:r>
+            <a:r>
+              <a:rPr lang="bg-BG" sz="3200" dirty="0">
+                <a:solidFill>
+                  <a:schemeClr val="bg2"/>
+                </a:solidFill>
+              </a:rPr>
+              <a:t> на </a:t>
+            </a:r>
+            <a:r>
+              <a:rPr lang="bg-BG" sz="3200" b="1" dirty="0">
+                <a:solidFill>
+                  <a:schemeClr val="bg2"/>
+                </a:solidFill>
+              </a:rPr>
+              <a:t>цветове</a:t>
+            </a:r>
+            <a:r>
+              <a:rPr lang="bg-BG" sz="3200" dirty="0">
+                <a:solidFill>
+                  <a:schemeClr val="bg2"/>
+                </a:solidFill>
+              </a:rPr>
+              <a:t> чрез </a:t>
+            </a:r>
+            <a:r>
+              <a:rPr lang="bg-BG" sz="3200" b="1" dirty="0">
+                <a:solidFill>
+                  <a:schemeClr val="bg2"/>
+                </a:solidFill>
+              </a:rPr>
+              <a:t>комбиниране</a:t>
+            </a:r>
+            <a:r>
+              <a:rPr lang="bg-BG" sz="3200" dirty="0">
+                <a:solidFill>
+                  <a:schemeClr val="bg2"/>
+                </a:solidFill>
+              </a:rPr>
+              <a:t> на </a:t>
+            </a:r>
+            <a:r>
+              <a:rPr lang="bg-BG" sz="3200" b="1" dirty="0">
+                <a:solidFill>
+                  <a:schemeClr val="bg2"/>
+                </a:solidFill>
+              </a:rPr>
+              <a:t>трите</a:t>
+            </a:r>
+            <a:r>
+              <a:rPr lang="bg-BG" sz="3200" dirty="0">
+                <a:solidFill>
+                  <a:schemeClr val="bg2"/>
+                </a:solidFill>
+              </a:rPr>
+              <a:t> основни </a:t>
+            </a:r>
+            <a:r>
+              <a:rPr lang="bg-BG" sz="3200" b="1" dirty="0">
+                <a:solidFill>
+                  <a:schemeClr val="bg2"/>
+                </a:solidFill>
+              </a:rPr>
+              <a:t>цвята</a:t>
+            </a:r>
+          </a:p>
+          <a:p>
             <a:pPr marL="381049">
               <a:buClr>
                 <a:schemeClr val="bg2"/>
               </a:buClr>
             </a:pPr>
             <a:r>
-              <a:rPr lang="en-US" sz="3200" b="1" dirty="0">
-                <a:solidFill>
-                  <a:srgbClr val="FF0000"/>
-                </a:solidFill>
-              </a:rPr>
-              <a:t>R</a:t>
-            </a:r>
-            <a:r>
-              <a:rPr lang="en-US" sz="3200" b="1" dirty="0">
-                <a:solidFill>
-                  <a:schemeClr val="accent2"/>
-                </a:solidFill>
-              </a:rPr>
-              <a:t>G</a:t>
-            </a:r>
-            <a:r>
-              <a:rPr lang="en-US" sz="3200" b="1" dirty="0">
-                <a:solidFill>
-                  <a:schemeClr val="accent3"/>
-                </a:solidFill>
-              </a:rPr>
-              <a:t>B</a:t>
-            </a:r>
-            <a:r>
-              <a:rPr lang="en-US" sz="3200" dirty="0">
-                <a:solidFill>
-                  <a:schemeClr val="accent3"/>
-                </a:solidFill>
-              </a:rPr>
-              <a:t> </a:t>
-            </a:r>
-            <a:r>
-              <a:rPr lang="bg-BG" sz="3200" b="1" dirty="0" smtClean="0">
-                <a:solidFill>
-                  <a:schemeClr val="bg2"/>
-                </a:solidFill>
-              </a:rPr>
-              <a:t>модел </a:t>
-            </a:r>
-            <a:r>
-              <a:rPr lang="bg-BG" sz="3200" dirty="0" smtClean="0">
-                <a:solidFill>
-                  <a:schemeClr val="bg2"/>
-                </a:solidFill>
-              </a:rPr>
-              <a:t>–</a:t>
-            </a:r>
-            <a:r>
-              <a:rPr lang="en-US" sz="3200" dirty="0" smtClean="0">
-                <a:solidFill>
-                  <a:schemeClr val="bg2"/>
-                </a:solidFill>
-              </a:rPr>
-              <a:t> </a:t>
-            </a:r>
-            <a:r>
-              <a:rPr lang="bg-BG" sz="3200" b="1" dirty="0" smtClean="0">
-                <a:solidFill>
-                  <a:schemeClr val="bg2"/>
-                </a:solidFill>
-              </a:rPr>
-              <a:t>създаване</a:t>
-            </a:r>
-            <a:r>
-              <a:rPr lang="bg-BG" sz="3200" dirty="0" smtClean="0">
-                <a:solidFill>
-                  <a:schemeClr val="bg2"/>
-                </a:solidFill>
-              </a:rPr>
-              <a:t> на </a:t>
-            </a:r>
-            <a:r>
-              <a:rPr lang="bg-BG" sz="3200" b="1" dirty="0" smtClean="0">
-                <a:solidFill>
-                  <a:schemeClr val="bg2"/>
-                </a:solidFill>
-              </a:rPr>
-              <a:t>цветове</a:t>
-            </a:r>
-            <a:r>
-              <a:rPr lang="bg-BG" sz="3200" dirty="0" smtClean="0">
-                <a:solidFill>
-                  <a:schemeClr val="bg2"/>
-                </a:solidFill>
-              </a:rPr>
-              <a:t>, чрез </a:t>
-            </a:r>
-            <a:r>
-              <a:rPr lang="bg-BG" sz="3200" b="1" dirty="0" smtClean="0">
-                <a:solidFill>
-                  <a:schemeClr val="bg2"/>
-                </a:solidFill>
-              </a:rPr>
-              <a:t>комбиниране</a:t>
-            </a:r>
-            <a:r>
-              <a:rPr lang="bg-BG" sz="3200" dirty="0" smtClean="0">
-                <a:solidFill>
-                  <a:schemeClr val="bg2"/>
-                </a:solidFill>
-              </a:rPr>
-              <a:t> на </a:t>
-            </a:r>
-            <a:r>
-              <a:rPr lang="bg-BG" sz="3200" b="1" dirty="0" smtClean="0">
-                <a:solidFill>
-                  <a:schemeClr val="bg2"/>
-                </a:solidFill>
-              </a:rPr>
-              <a:t>трите</a:t>
-            </a:r>
-            <a:r>
-              <a:rPr lang="bg-BG" sz="3200" dirty="0" smtClean="0">
-                <a:solidFill>
-                  <a:schemeClr val="bg2"/>
-                </a:solidFill>
-              </a:rPr>
-              <a:t> основни </a:t>
-            </a:r>
-            <a:r>
-              <a:rPr lang="bg-BG" sz="3200" b="1" dirty="0" smtClean="0">
-                <a:solidFill>
-                  <a:schemeClr val="bg2"/>
-                </a:solidFill>
-              </a:rPr>
-              <a:t>цвята </a:t>
-            </a:r>
-          </a:p>
-          <a:p>
-            <a:pPr marL="381049">
-              <a:buClr>
-                <a:schemeClr val="bg2"/>
-              </a:buClr>
-            </a:pPr>
-            <a:r>
-              <a:rPr lang="bg-BG" sz="3200" dirty="0" smtClean="0">
+              <a:rPr lang="bg-BG" sz="3200" dirty="0">
                 <a:solidFill>
                   <a:schemeClr val="bg2"/>
                 </a:solidFill>
@@ -11089,7 +11037,7 @@
               </a:buClr>
             </a:pPr>
             <a:r>
-              <a:rPr lang="bg-BG" sz="3000" b="1" dirty="0" smtClean="0">
+              <a:rPr lang="bg-BG" sz="3000" b="1" dirty="0">
                 <a:solidFill>
                   <a:schemeClr val="bg1">
                     <a:lumMod val="60000"/>
@@ -11097,10 +11045,10 @@
                   </a:schemeClr>
                 </a:solidFill>
               </a:rPr>
-              <a:t>Запълване </a:t>
-            </a:r>
-            <a:r>
-              <a:rPr lang="bg-BG" sz="3000" b="1" dirty="0">
+              <a:t>Запълване с цвят</a:t>
+            </a:r>
+            <a:r>
+              <a:rPr lang="bg-BG" sz="3000" dirty="0">
                 <a:solidFill>
                   <a:schemeClr val="bg1">
                     <a:lumMod val="60000"/>
@@ -11108,21 +11056,10 @@
                   </a:schemeClr>
                 </a:solidFill>
               </a:rPr>
-              <a:t>с цвят</a:t>
+              <a:t> </a:t>
             </a:r>
             <a:r>
               <a:rPr lang="bg-BG" sz="3000" dirty="0">
-                <a:solidFill>
-                  <a:schemeClr val="bg1">
-                    <a:lumMod val="60000"/>
-                    <a:lumOff val="40000"/>
-                  </a:schemeClr>
-                </a:solidFill>
-              </a:rPr>
-              <a:t> </a:t>
-            </a:r>
-            <a:r>
-              <a:rPr lang="bg-BG" sz="3000" dirty="0" smtClean="0">
                 <a:solidFill>
                   <a:schemeClr val="bg2"/>
                 </a:solidFill>
@@ -11130,28 +11067,12 @@
               <a:t>– </a:t>
             </a:r>
             <a:r>
-              <a:rPr lang="bg-BG" sz="3000" b="1" dirty="0" smtClean="0">
+              <a:rPr lang="bg-BG" sz="3000" b="1" dirty="0">
                 <a:solidFill>
                   <a:schemeClr val="bg2"/>
                 </a:solidFill>
               </a:rPr>
-              <a:t>оцветяване </a:t>
-            </a:r>
-            <a:r>
-              <a:rPr lang="bg-BG" sz="3000" b="1" dirty="0">
-                <a:solidFill>
-                  <a:schemeClr val="bg2"/>
-                </a:solidFill>
-              </a:rPr>
-              <a:t>на </a:t>
-            </a:r>
-            <a:r>
-              <a:rPr lang="bg-BG" sz="3000" b="1" dirty="0" smtClean="0">
-                <a:solidFill>
-                  <a:schemeClr val="bg2"/>
-                </a:solidFill>
-              </a:rPr>
-              <a:t>области</a:t>
+              <a:t>оцветяване на области</a:t>
             </a:r>
           </a:p>
           <a:p>
@@ -11164,7 +11085,7 @@
               </a:buClr>
             </a:pPr>
             <a:r>
-              <a:rPr lang="bg-BG" sz="2800" b="1" dirty="0" smtClean="0">
+              <a:rPr lang="bg-BG" sz="2800" b="1" dirty="0">
                 <a:solidFill>
                   <a:schemeClr val="bg1">
                     <a:lumMod val="60000"/>
@@ -11172,10 +11093,10 @@
                   </a:schemeClr>
                 </a:solidFill>
               </a:rPr>
-              <a:t>Избор </a:t>
-            </a:r>
-            <a:r>
-              <a:rPr lang="bg-BG" sz="2800" b="1" dirty="0">
+              <a:t>Избор на цвят</a:t>
+            </a:r>
+            <a:r>
+              <a:rPr lang="bg-BG" sz="2800" dirty="0">
                 <a:solidFill>
                   <a:schemeClr val="bg1">
                     <a:lumMod val="60000"/>
@@ -11183,21 +11104,10 @@
                   </a:schemeClr>
                 </a:solidFill>
               </a:rPr>
-              <a:t>на цвят</a:t>
+              <a:t> </a:t>
             </a:r>
             <a:r>
               <a:rPr lang="bg-BG" sz="2800" dirty="0">
-                <a:solidFill>
-                  <a:schemeClr val="bg1">
-                    <a:lumMod val="60000"/>
-                    <a:lumOff val="40000"/>
-                  </a:schemeClr>
-                </a:solidFill>
-              </a:rPr>
-              <a:t> </a:t>
-            </a:r>
-            <a:r>
-              <a:rPr lang="bg-BG" sz="2800" dirty="0" smtClean="0">
                 <a:solidFill>
                   <a:schemeClr val="bg2"/>
                 </a:solidFill>
@@ -11205,20 +11115,12 @@
               <a:t>– </a:t>
             </a:r>
             <a:r>
-              <a:rPr lang="ru-RU" sz="2800" dirty="0" smtClean="0">
+              <a:rPr lang="ru-RU" sz="2800" dirty="0">
                 <a:solidFill>
                   <a:schemeClr val="bg2"/>
                 </a:solidFill>
               </a:rPr>
-              <a:t>потребителите </a:t>
-            </a:r>
-            <a:r>
-              <a:rPr lang="ru-RU" sz="2800" dirty="0">
-                <a:solidFill>
-                  <a:schemeClr val="bg2"/>
-                </a:solidFill>
-              </a:rPr>
-              <a:t>да избират конкретни</a:t>
+              <a:t>потребителите да избират конкретни</a:t>
             </a:r>
             <a:r>
               <a:rPr lang="ru-RU" sz="2800" b="1" dirty="0">
@@ -11252,7 +11154,7 @@
               </a:buClr>
             </a:pPr>
             <a:r>
-              <a:rPr lang="bg-BG" sz="3200" b="1" dirty="0" smtClean="0">
+              <a:rPr lang="bg-BG" sz="3200" b="1" dirty="0">
                 <a:solidFill>
                   <a:schemeClr val="bg2"/>
                 </a:solidFill>
@@ -11260,7 +11162,7 @@
               <a:t>Създаване</a:t>
             </a:r>
             <a:r>
-              <a:rPr lang="bg-BG" sz="3200" dirty="0" smtClean="0">
+              <a:rPr lang="bg-BG" sz="3200" dirty="0">
                 <a:solidFill>
                   <a:schemeClr val="bg2"/>
                 </a:solidFill>
@@ -11268,7 +11170,7 @@
               <a:t> на </a:t>
             </a:r>
             <a:r>
-              <a:rPr lang="bg-BG" sz="3200" b="1" dirty="0" smtClean="0">
+              <a:rPr lang="bg-BG" sz="3200" b="1" dirty="0">
                 <a:solidFill>
                   <a:schemeClr val="bg1">
                     <a:lumMod val="60000"/>
@@ -11293,7 +11195,7 @@
                 <a:schemeClr val="bg2"/>
               </a:buClr>
             </a:pPr>
-            <a:endParaRPr lang="bg-BG" sz="2800" dirty="0" smtClean="0">
+            <a:endParaRPr lang="bg-BG" sz="2800" dirty="0">
               <a:solidFill>
                 <a:schemeClr val="bg2"/>
               </a:solidFill>
@@ -11677,7 +11579,7 @@
                 <a:hlinkClick r:id="rId3">
                   <a:extLst>
                     <a:ext uri="{A12FA001-AC4F-418D-AE19-62706E023703}">
-                      <ahyp:hlinkClr xmlns:ahyp="http://schemas.microsoft.com/office/drawing/2018/hyperlinkcolor" xmlns="" val="tx"/>
+                      <ahyp:hlinkClr xmlns:ahyp="http://schemas.microsoft.com/office/drawing/2018/hyperlinkcolor" val="tx"/>
                     </a:ext>
                   </a:extLst>
                 </a:hlinkClick>
@@ -11750,13 +11652,6 @@
       <p:transition spd="slow" advClick="0" advTm="5000"/>
     </mc:Fallback>
   </mc:AlternateContent>
-  <p:timing>
-    <p:tnLst>
-      <p:par>
-        <p:cTn id="1" dur="indefinite" restart="never" nodeType="tmRoot"/>
-      </p:par>
-    </p:tnLst>
-  </p:timing>
 </p:sld>
 </file>
 
@@ -12140,13 +12035,6 @@
       <p:transition spd="slow" advClick="0" advTm="5000"/>
     </mc:Fallback>
   </mc:AlternateContent>
-  <p:timing>
-    <p:tnLst>
-      <p:par>
-        <p:cTn id="1" dur="indefinite" restart="never" nodeType="tmRoot"/>
-      </p:par>
-    </p:tnLst>
-  </p:timing>
 </p:sld>
 </file>
 
@@ -12318,35 +12206,35 @@
           <a:lstStyle/>
           <a:p>
             <a:r>
-              <a:rPr lang="en-US" dirty="0" smtClean="0"/>
+              <a:rPr lang="en-US" dirty="0"/>
               <a:t>͏</a:t>
             </a:r>
             <a:r>
-              <a:rPr lang="bg-BG" b="1" dirty="0" smtClean="0"/>
+              <a:rPr lang="bg-BG" b="1" dirty="0"/>
               <a:t>Работа с цветове</a:t>
             </a:r>
           </a:p>
           <a:p>
             <a:r>
-              <a:rPr lang="bg-BG" dirty="0" smtClean="0"/>
+              <a:rPr lang="bg-BG" dirty="0"/>
               <a:t>͏</a:t>
             </a:r>
             <a:r>
-              <a:rPr lang="bg-BG" b="1" dirty="0" smtClean="0"/>
+              <a:rPr lang="bg-BG" b="1" dirty="0"/>
               <a:t>Запълване</a:t>
             </a:r>
             <a:r>
-              <a:rPr lang="bg-BG" dirty="0" smtClean="0"/>
+              <a:rPr lang="bg-BG" dirty="0"/>
               <a:t> с цвят</a:t>
             </a:r>
           </a:p>
           <a:p>
             <a:r>
-              <a:rPr lang="bg-BG" dirty="0" smtClean="0"/>
+              <a:rPr lang="bg-BG" dirty="0"/>
               <a:t>Създаване на </a:t>
             </a:r>
             <a:r>
-              <a:rPr lang="bg-BG" b="1" dirty="0" smtClean="0"/>
+              <a:rPr lang="bg-BG" b="1" dirty="0"/>
               <a:t>собствен цвят</a:t>
             </a:r>
           </a:p>
@@ -12621,11 +12509,7 @@
             </a:r>
             <a:r>
               <a:rPr lang="bg-BG" dirty="0"/>
-              <a:t>Работа с </a:t>
-            </a:r>
-            <a:r>
-              <a:rPr lang="bg-BG" dirty="0" smtClean="0"/>
-              <a:t>цветове</a:t>
+              <a:t>Работа с цветове</a:t>
             </a:r>
             <a:endParaRPr lang="en-US" dirty="0"/>
           </a:p>
@@ -12718,13 +12602,6 @@
       <p:transition spd="slow" advClick="0" advTm="5000"/>
     </mc:Fallback>
   </mc:AlternateContent>
-  <p:timing>
-    <p:tnLst>
-      <p:par>
-        <p:cTn id="1" dur="indefinite" restart="never" nodeType="tmRoot"/>
-      </p:par>
-    </p:tnLst>
-  </p:timing>
 </p:sld>
 </file>
 
@@ -12768,11 +12645,11 @@
           <a:lstStyle/>
           <a:p>
             <a:r>
-              <a:rPr lang="bg-BG" dirty="0" smtClean="0"/>
+              <a:rPr lang="bg-BG" dirty="0"/>
               <a:t>В </a:t>
             </a:r>
             <a:r>
-              <a:rPr lang="en-US" b="1" dirty="0" smtClean="0">
+              <a:rPr lang="en-US" b="1" dirty="0">
                 <a:solidFill>
                   <a:schemeClr val="bg1"/>
                 </a:solidFill>
@@ -12780,53 +12657,53 @@
               <a:t>Paint</a:t>
             </a:r>
             <a:r>
-              <a:rPr lang="en-US" dirty="0" smtClean="0"/>
+              <a:rPr lang="en-US" dirty="0"/>
               <a:t> </a:t>
             </a:r>
             <a:r>
-              <a:rPr lang="bg-BG" dirty="0" smtClean="0"/>
+              <a:rPr lang="bg-BG" dirty="0"/>
               <a:t>има изобр между </a:t>
             </a:r>
             <a:r>
-              <a:rPr lang="bg-BG" b="1" dirty="0" smtClean="0"/>
+              <a:rPr lang="bg-BG" b="1" dirty="0"/>
               <a:t>над 16 млн. цвята </a:t>
             </a:r>
           </a:p>
           <a:p>
             <a:r>
-              <a:rPr lang="bg-BG" dirty="0" smtClean="0"/>
+              <a:rPr lang="bg-BG" dirty="0"/>
               <a:t>Всеки цвят в компютъра се образува от </a:t>
             </a:r>
             <a:r>
-              <a:rPr lang="bg-BG" b="1" dirty="0" smtClean="0"/>
+              <a:rPr lang="bg-BG" b="1" dirty="0"/>
               <a:t>смесването</a:t>
             </a:r>
             <a:r>
-              <a:rPr lang="bg-BG" dirty="0" smtClean="0"/>
+              <a:rPr lang="bg-BG" dirty="0"/>
               <a:t> на </a:t>
             </a:r>
             <a:r>
-              <a:rPr lang="bg-BG" b="1" dirty="0" smtClean="0"/>
+              <a:rPr lang="bg-BG" b="1" dirty="0"/>
               <a:t>трите</a:t>
             </a:r>
             <a:r>
-              <a:rPr lang="bg-BG" dirty="0" smtClean="0"/>
+              <a:rPr lang="bg-BG" dirty="0"/>
               <a:t> основни</a:t>
             </a:r>
             <a:r>
-              <a:rPr lang="bg-BG" b="1" dirty="0" smtClean="0"/>
+              <a:rPr lang="bg-BG" b="1" dirty="0"/>
               <a:t> цвята</a:t>
             </a:r>
             <a:r>
-              <a:rPr lang="en-US" b="1" dirty="0" smtClean="0"/>
+              <a:rPr lang="en-US" b="1" dirty="0"/>
               <a:t> </a:t>
             </a:r>
             <a:r>
-              <a:rPr lang="en-US" dirty="0" smtClean="0"/>
+              <a:rPr lang="en-US" dirty="0"/>
               <a:t>– (</a:t>
             </a:r>
             <a:r>
-              <a:rPr lang="en-US" b="1" dirty="0" smtClean="0">
+              <a:rPr lang="en-US" b="1" dirty="0">
                 <a:solidFill>
                   <a:srgbClr val="FF0000"/>
                 </a:solidFill>
@@ -12834,7 +12711,7 @@
               <a:t>R</a:t>
             </a:r>
             <a:r>
-              <a:rPr lang="en-US" b="1" dirty="0" smtClean="0">
+              <a:rPr lang="en-US" b="1" dirty="0">
                 <a:solidFill>
                   <a:schemeClr val="accent2"/>
                 </a:solidFill>
@@ -12842,7 +12719,7 @@
               <a:t>G</a:t>
             </a:r>
             <a:r>
-              <a:rPr lang="en-US" b="1" dirty="0" smtClean="0">
+              <a:rPr lang="en-US" b="1" dirty="0">
                 <a:solidFill>
                   <a:schemeClr val="accent3"/>
                 </a:solidFill>
@@ -12850,7 +12727,7 @@
               <a:t>B</a:t>
             </a:r>
             <a:r>
-              <a:rPr lang="en-US" dirty="0" smtClean="0">
+              <a:rPr lang="en-US" dirty="0">
                 <a:solidFill>
                   <a:schemeClr val="accent3"/>
                 </a:solidFill>
@@ -12858,34 +12735,34 @@
               <a:t> </a:t>
             </a:r>
             <a:r>
-              <a:rPr lang="bg-BG" b="1" dirty="0" smtClean="0"/>
+              <a:rPr lang="bg-BG" b="1" dirty="0"/>
               <a:t>модел</a:t>
             </a:r>
             <a:r>
-              <a:rPr lang="en-US" dirty="0" smtClean="0"/>
+              <a:rPr lang="en-US" dirty="0"/>
               <a:t>)</a:t>
             </a:r>
             <a:r>
-              <a:rPr lang="bg-BG" dirty="0" smtClean="0"/>
+              <a:rPr lang="bg-BG" dirty="0"/>
               <a:t>:</a:t>
             </a:r>
           </a:p>
           <a:p>
             <a:pPr lvl="1"/>
             <a:r>
-              <a:rPr lang="bg-BG" b="1" dirty="0" smtClean="0"/>
+              <a:rPr lang="bg-BG" b="1" dirty="0"/>
               <a:t>Червен</a:t>
             </a:r>
             <a:r>
-              <a:rPr lang="bg-BG" dirty="0" smtClean="0"/>
+              <a:rPr lang="bg-BG" dirty="0"/>
               <a:t> </a:t>
             </a:r>
             <a:r>
-              <a:rPr lang="en-US" dirty="0" smtClean="0"/>
+              <a:rPr lang="en-US" dirty="0"/>
               <a:t>(</a:t>
             </a:r>
             <a:r>
-              <a:rPr lang="en-US" b="1" dirty="0" smtClean="0">
+              <a:rPr lang="en-US" b="1" dirty="0">
                 <a:solidFill>
                   <a:srgbClr val="FF0000"/>
                 </a:solidFill>
@@ -12893,22 +12770,22 @@
               <a:t>Red</a:t>
             </a:r>
             <a:r>
-              <a:rPr lang="en-US" dirty="0" smtClean="0"/>
+              <a:rPr lang="en-US" dirty="0"/>
               <a:t>)</a:t>
             </a:r>
           </a:p>
           <a:p>
             <a:pPr lvl="1"/>
             <a:r>
-              <a:rPr lang="bg-BG" b="1" dirty="0" smtClean="0"/>
+              <a:rPr lang="bg-BG" b="1" dirty="0"/>
               <a:t>Зелен</a:t>
             </a:r>
             <a:r>
-              <a:rPr lang="bg-BG" dirty="0" smtClean="0"/>
+              <a:rPr lang="bg-BG" dirty="0"/>
               <a:t> (</a:t>
             </a:r>
             <a:r>
-              <a:rPr lang="en-US" b="1" dirty="0" smtClean="0">
+              <a:rPr lang="en-US" b="1" dirty="0">
                 <a:solidFill>
                   <a:schemeClr val="accent2"/>
                 </a:solidFill>
@@ -12916,23 +12793,23 @@
               <a:t>Green</a:t>
             </a:r>
             <a:r>
-              <a:rPr lang="bg-BG" dirty="0" smtClean="0"/>
+              <a:rPr lang="bg-BG" dirty="0"/>
               <a:t>)</a:t>
             </a:r>
-            <a:endParaRPr lang="en-US" dirty="0" smtClean="0"/>
+            <a:endParaRPr lang="en-US" dirty="0"/>
           </a:p>
           <a:p>
             <a:pPr lvl="1"/>
             <a:r>
-              <a:rPr lang="bg-BG" b="1" dirty="0" smtClean="0"/>
+              <a:rPr lang="bg-BG" b="1" dirty="0"/>
               <a:t>Син</a:t>
             </a:r>
             <a:r>
-              <a:rPr lang="bg-BG" dirty="0" smtClean="0"/>
+              <a:rPr lang="bg-BG" dirty="0"/>
               <a:t> (</a:t>
             </a:r>
             <a:r>
-              <a:rPr lang="en-US" b="1" dirty="0" smtClean="0">
+              <a:rPr lang="en-US" b="1" dirty="0">
                 <a:solidFill>
                   <a:schemeClr val="accent3"/>
                 </a:solidFill>
@@ -12940,34 +12817,30 @@
               <a:t>Blue</a:t>
             </a:r>
             <a:r>
-              <a:rPr lang="bg-BG" dirty="0" smtClean="0"/>
+              <a:rPr lang="bg-BG" dirty="0"/>
               <a:t>)</a:t>
             </a:r>
           </a:p>
           <a:p>
             <a:r>
-              <a:rPr lang="bg-BG" dirty="0" smtClean="0"/>
+              <a:rPr lang="bg-BG" dirty="0"/>
               <a:t>При </a:t>
             </a:r>
             <a:r>
-              <a:rPr lang="bg-BG" b="1" dirty="0" smtClean="0"/>
+              <a:rPr lang="bg-BG" b="1" dirty="0"/>
               <a:t>смесването</a:t>
             </a:r>
             <a:r>
-              <a:rPr lang="bg-BG" dirty="0" smtClean="0"/>
+              <a:rPr lang="bg-BG" dirty="0"/>
               <a:t> на </a:t>
             </a:r>
             <a:r>
-              <a:rPr lang="bg-BG" b="1" dirty="0" smtClean="0"/>
+              <a:rPr lang="bg-BG" b="1" dirty="0"/>
               <a:t>трите цвята </a:t>
             </a:r>
             <a:r>
-              <a:rPr lang="bg-BG" dirty="0" smtClean="0"/>
-              <a:t>с различни стойности </a:t>
-            </a:r>
-            <a:r>
               <a:rPr lang="bg-BG" dirty="0"/>
-              <a:t>(</a:t>
+              <a:t>с различни стойности (</a:t>
             </a:r>
             <a:r>
               <a:rPr lang="bg-BG" b="1" dirty="0"/>
@@ -12978,19 +12851,19 @@
               <a:t> – </a:t>
             </a:r>
             <a:r>
-              <a:rPr lang="bg-BG" b="1" dirty="0" smtClean="0"/>
+              <a:rPr lang="bg-BG" b="1" dirty="0"/>
               <a:t>255</a:t>
             </a:r>
             <a:r>
-              <a:rPr lang="bg-BG" dirty="0" smtClean="0"/>
+              <a:rPr lang="bg-BG" dirty="0"/>
               <a:t>) се получават </a:t>
             </a:r>
             <a:r>
-              <a:rPr lang="bg-BG" b="1" dirty="0" smtClean="0"/>
+              <a:rPr lang="bg-BG" b="1" dirty="0"/>
               <a:t>различни нюанси </a:t>
             </a:r>
             <a:r>
-              <a:rPr lang="bg-BG" dirty="0" smtClean="0"/>
+              <a:rPr lang="bg-BG" dirty="0"/>
               <a:t>на цветовете</a:t>
             </a:r>
             <a:endParaRPr lang="en-US" dirty="0"/>
@@ -13013,7 +12886,7 @@
           <a:lstStyle/>
           <a:p>
             <a:r>
-              <a:rPr lang="bg-BG" dirty="0" smtClean="0"/>
+              <a:rPr lang="bg-BG" dirty="0"/>
               <a:t>Работа с цветове</a:t>
             </a:r>
             <a:endParaRPr lang="en-US" dirty="0"/>
@@ -13448,11 +13321,11 @@
           <a:lstStyle/>
           <a:p>
             <a:r>
-              <a:rPr lang="bg-BG" b="1" dirty="0" smtClean="0"/>
+              <a:rPr lang="bg-BG" b="1" dirty="0"/>
               <a:t>͏</a:t>
             </a:r>
             <a:r>
-              <a:rPr lang="bg-BG" b="1" dirty="0" smtClean="0">
+              <a:rPr lang="bg-BG" b="1" dirty="0">
                 <a:solidFill>
                   <a:schemeClr val="bg1"/>
                 </a:solidFill>
@@ -13460,27 +13333,27 @@
               <a:t>Цветова палитра </a:t>
             </a:r>
             <a:r>
-              <a:rPr lang="bg-BG" dirty="0" smtClean="0"/>
+              <a:rPr lang="bg-BG" dirty="0"/>
               <a:t>– инструментът за </a:t>
             </a:r>
             <a:r>
-              <a:rPr lang="bg-BG" b="1" dirty="0" smtClean="0"/>
+              <a:rPr lang="bg-BG" b="1" dirty="0"/>
               <a:t>избор</a:t>
             </a:r>
             <a:r>
-              <a:rPr lang="bg-BG" dirty="0" smtClean="0"/>
+              <a:rPr lang="bg-BG" dirty="0"/>
               <a:t> на </a:t>
             </a:r>
             <a:r>
-              <a:rPr lang="bg-BG" b="1" dirty="0" smtClean="0"/>
+              <a:rPr lang="bg-BG" b="1" dirty="0"/>
               <a:t>цвят</a:t>
             </a:r>
             <a:r>
-              <a:rPr lang="bg-BG" dirty="0" smtClean="0"/>
+              <a:rPr lang="bg-BG" dirty="0"/>
               <a:t> в </a:t>
             </a:r>
             <a:r>
-              <a:rPr lang="en-US" b="1" dirty="0" smtClean="0">
+              <a:rPr lang="en-US" b="1" dirty="0">
                 <a:solidFill>
                   <a:schemeClr val="bg1"/>
                 </a:solidFill>
@@ -13490,15 +13363,15 @@
           </a:p>
           <a:p>
             <a:r>
-              <a:rPr lang="bg-BG" dirty="0" smtClean="0"/>
+              <a:rPr lang="bg-BG" dirty="0"/>
               <a:t>Намира се на </a:t>
             </a:r>
             <a:r>
-              <a:rPr lang="bg-BG" b="1" dirty="0" smtClean="0"/>
+              <a:rPr lang="bg-BG" b="1" dirty="0"/>
               <a:t>панела </a:t>
             </a:r>
             <a:r>
-              <a:rPr lang="en-US" b="1" dirty="0" smtClean="0">
+              <a:rPr lang="en-US" b="1" dirty="0">
                 <a:solidFill>
                   <a:schemeClr val="bg1"/>
                 </a:solidFill>
@@ -13506,19 +13379,19 @@
               <a:t>Colors</a:t>
             </a:r>
             <a:r>
-              <a:rPr lang="en-US" b="1" dirty="0" smtClean="0"/>
+              <a:rPr lang="en-US" b="1" dirty="0"/>
               <a:t> </a:t>
             </a:r>
             <a:r>
-              <a:rPr lang="bg-BG" dirty="0" smtClean="0"/>
+              <a:rPr lang="bg-BG" dirty="0"/>
               <a:t>в </a:t>
             </a:r>
             <a:r>
-              <a:rPr lang="bg-BG" b="1" dirty="0" smtClean="0"/>
+              <a:rPr lang="bg-BG" b="1" dirty="0"/>
               <a:t>менюто </a:t>
             </a:r>
             <a:r>
-              <a:rPr lang="en-US" b="1" dirty="0" smtClean="0">
+              <a:rPr lang="en-US" b="1" dirty="0">
                 <a:solidFill>
                   <a:schemeClr val="bg1"/>
                 </a:solidFill>
@@ -13528,22 +13401,22 @@
           </a:p>
           <a:p>
             <a:r>
-              <a:rPr lang="bg-BG" b="1" dirty="0" smtClean="0"/>
+              <a:rPr lang="bg-BG" b="1" dirty="0"/>
               <a:t>Главни цветове</a:t>
             </a:r>
             <a:r>
-              <a:rPr lang="bg-BG" dirty="0" smtClean="0"/>
+              <a:rPr lang="bg-BG" dirty="0"/>
               <a:t>:</a:t>
             </a:r>
           </a:p>
           <a:p>
             <a:pPr lvl="1"/>
             <a:r>
-              <a:rPr lang="en-US" dirty="0" smtClean="0"/>
+              <a:rPr lang="en-US" dirty="0"/>
               <a:t>͏</a:t>
             </a:r>
             <a:r>
-              <a:rPr lang="en-US" b="1" dirty="0" smtClean="0">
+              <a:rPr lang="en-US" b="1" dirty="0">
                 <a:solidFill>
                   <a:schemeClr val="bg1"/>
                 </a:solidFill>
@@ -13551,34 +13424,34 @@
               <a:t>Color 1</a:t>
             </a:r>
             <a:r>
-              <a:rPr lang="en-US" dirty="0" smtClean="0"/>
+              <a:rPr lang="en-US" dirty="0"/>
               <a:t> – </a:t>
             </a:r>
             <a:r>
-              <a:rPr lang="bg-BG" b="1" dirty="0" smtClean="0"/>
+              <a:rPr lang="bg-BG" b="1" dirty="0"/>
               <a:t>основен</a:t>
             </a:r>
             <a:r>
-              <a:rPr lang="bg-BG" dirty="0" smtClean="0"/>
+              <a:rPr lang="bg-BG" dirty="0"/>
               <a:t> цвят (Рисуване с </a:t>
             </a:r>
             <a:r>
-              <a:rPr lang="bg-BG" b="1" dirty="0" smtClean="0"/>
+              <a:rPr lang="bg-BG" b="1" dirty="0"/>
               <a:t>ляв бутон </a:t>
             </a:r>
             <a:r>
-              <a:rPr lang="bg-BG" dirty="0" smtClean="0"/>
+              <a:rPr lang="bg-BG" dirty="0"/>
               <a:t>на мишката)</a:t>
             </a:r>
           </a:p>
           <a:p>
             <a:pPr lvl="1"/>
             <a:r>
-              <a:rPr lang="en-US" dirty="0" smtClean="0"/>
+              <a:rPr lang="en-US" dirty="0"/>
               <a:t>͏</a:t>
             </a:r>
             <a:r>
-              <a:rPr lang="en-US" b="1" dirty="0" smtClean="0">
+              <a:rPr lang="en-US" b="1" dirty="0">
                 <a:solidFill>
                   <a:schemeClr val="bg1"/>
                 </a:solidFill>
@@ -13586,53 +13459,45 @@
               <a:t>Color 2</a:t>
             </a:r>
             <a:r>
-              <a:rPr lang="en-US" dirty="0" smtClean="0"/>
+              <a:rPr lang="en-US" dirty="0"/>
               <a:t> </a:t>
             </a:r>
             <a:r>
-              <a:rPr lang="bg-BG" dirty="0" smtClean="0"/>
+              <a:rPr lang="bg-BG" dirty="0"/>
               <a:t>– </a:t>
             </a:r>
             <a:r>
-              <a:rPr lang="bg-BG" b="1" dirty="0" smtClean="0"/>
+              <a:rPr lang="bg-BG" b="1" dirty="0"/>
               <a:t>фонов</a:t>
             </a:r>
             <a:r>
-              <a:rPr lang="bg-BG" dirty="0" smtClean="0"/>
-              <a:t> цвят </a:t>
-            </a:r>
-            <a:r>
               <a:rPr lang="bg-BG" dirty="0"/>
-              <a:t>(Рисуване с </a:t>
-            </a:r>
-            <a:r>
-              <a:rPr lang="bg-BG" b="1" dirty="0" smtClean="0"/>
+              <a:t> цвят (Рисуване с </a:t>
+            </a:r>
+            <a:r>
+              <a:rPr lang="bg-BG" b="1" dirty="0"/>
               <a:t>десен бутон </a:t>
             </a:r>
             <a:r>
               <a:rPr lang="bg-BG" dirty="0"/>
-              <a:t>на мишката</a:t>
-            </a:r>
-            <a:r>
-              <a:rPr lang="bg-BG" dirty="0" smtClean="0"/>
-              <a:t>)</a:t>
-            </a:r>
-          </a:p>
-          <a:p>
-            <a:r>
-              <a:rPr lang="bg-BG" dirty="0" smtClean="0"/>
+              <a:t>на мишката)</a:t>
+            </a:r>
+          </a:p>
+          <a:p>
+            <a:r>
+              <a:rPr lang="bg-BG" dirty="0"/>
               <a:t>Главните цветове се </a:t>
             </a:r>
             <a:r>
-              <a:rPr lang="bg-BG" b="1" dirty="0" smtClean="0"/>
+              <a:rPr lang="bg-BG" b="1" dirty="0"/>
               <a:t>избират</a:t>
             </a:r>
             <a:r>
-              <a:rPr lang="bg-BG" dirty="0" smtClean="0"/>
+              <a:rPr lang="bg-BG" dirty="0"/>
               <a:t> от </a:t>
             </a:r>
             <a:r>
-              <a:rPr lang="bg-BG" b="1" dirty="0" smtClean="0"/>
+              <a:rPr lang="bg-BG" b="1" dirty="0"/>
               <a:t>цветовата палитра</a:t>
             </a:r>
           </a:p>
@@ -13658,7 +13523,7 @@
           <a:lstStyle/>
           <a:p>
             <a:r>
-              <a:rPr lang="bg-BG" dirty="0" smtClean="0"/>
+              <a:rPr lang="bg-BG" dirty="0"/>
               <a:t>Цветова палитра</a:t>
             </a:r>
             <a:endParaRPr lang="en-US" dirty="0"/>
@@ -14076,14 +13941,13 @@
           <a:lstStyle/>
           <a:p>
             <a:r>
-              <a:rPr lang="bg-BG" dirty="0" smtClean="0"/>
+              <a:rPr lang="bg-BG" dirty="0"/>
               <a:t>Инструменти при работа с цветове в </a:t>
             </a:r>
             <a:r>
-              <a:rPr lang="en-US" dirty="0" smtClean="0"/>
+              <a:rPr lang="en-US" dirty="0"/>
               <a:t>Paint</a:t>
             </a:r>
-            <a:endParaRPr lang="en-US" dirty="0"/>
           </a:p>
         </p:txBody>
       </p:sp>
@@ -14104,11 +13968,7 @@
           <a:p>
             <a:r>
               <a:rPr lang="bg-BG" dirty="0"/>
-              <a:t>͏Запълване с </a:t>
-            </a:r>
-            <a:r>
-              <a:rPr lang="bg-BG" dirty="0" smtClean="0"/>
-              <a:t>цвят</a:t>
+              <a:t>͏Запълване с цвят</a:t>
             </a:r>
             <a:endParaRPr lang="en-US" dirty="0"/>
           </a:p>
@@ -14194,13 +14054,6 @@
       <p:transition spd="slow" advClick="0" advTm="5000"/>
     </mc:Fallback>
   </mc:AlternateContent>
-  <p:timing>
-    <p:tnLst>
-      <p:par>
-        <p:cTn id="1" dur="indefinite" restart="never" nodeType="tmRoot"/>
-      </p:par>
-    </p:tnLst>
-  </p:timing>
 </p:sld>
 </file>
 
@@ -14279,32 +14132,28 @@
           <a:lstStyle/>
           <a:p>
             <a:r>
-              <a:rPr lang="bg-BG" dirty="0" smtClean="0"/>
+              <a:rPr lang="bg-BG" dirty="0"/>
               <a:t>Инструментът </a:t>
             </a:r>
             <a:r>
-              <a:rPr lang="bg-BG" b="1" dirty="0" smtClean="0">
+              <a:rPr lang="en-US" b="1" dirty="0">
                 <a:solidFill>
                   <a:schemeClr val="bg1"/>
                 </a:solidFill>
               </a:rPr>
+              <a:t>Fill With Color</a:t>
+            </a:r>
+            <a:r>
+              <a:rPr lang="bg-BG" dirty="0"/>
+              <a:t> (</a:t>
+            </a:r>
+            <a:r>
+              <a:rPr lang="bg-BG" b="1" dirty="0"/>
               <a:t>запълване с цвят</a:t>
             </a:r>
             <a:r>
-              <a:rPr lang="bg-BG" dirty="0" smtClean="0"/>
-              <a:t> (</a:t>
-            </a:r>
-            <a:r>
-              <a:rPr lang="en-US" b="1" dirty="0" smtClean="0"/>
-              <a:t>Fill With Color</a:t>
-            </a:r>
-            <a:r>
-              <a:rPr lang="bg-BG" dirty="0" smtClean="0"/>
-              <a:t>) служи </a:t>
-            </a:r>
-            <a:r>
               <a:rPr lang="bg-BG" dirty="0"/>
-              <a:t>за </a:t>
+              <a:t>) служи за </a:t>
             </a:r>
             <a:r>
               <a:rPr lang="bg-BG" b="1" dirty="0"/>
@@ -14315,22 +14164,22 @@
           <a:p>
             <a:pPr lvl="1"/>
             <a:r>
-              <a:rPr lang="bg-BG" dirty="0" smtClean="0"/>
+              <a:rPr lang="bg-BG" dirty="0"/>
               <a:t>Намира се в </a:t>
             </a:r>
             <a:r>
-              <a:rPr lang="bg-BG" b="1" dirty="0" smtClean="0"/>
+              <a:rPr lang="bg-BG" b="1" dirty="0"/>
               <a:t>панела </a:t>
             </a:r>
             <a:r>
-              <a:rPr lang="en-US" b="1" dirty="0" smtClean="0">
+              <a:rPr lang="en-US" b="1" dirty="0">
                 <a:solidFill>
                   <a:schemeClr val="bg1"/>
                 </a:solidFill>
               </a:rPr>
               <a:t>Tools</a:t>
             </a:r>
-            <a:endParaRPr lang="bg-BG" b="1" dirty="0" smtClean="0">
+            <a:endParaRPr lang="bg-BG" b="1" dirty="0">
               <a:solidFill>
                 <a:schemeClr val="bg1"/>
               </a:solidFill>
@@ -14338,23 +14187,23 @@
           </a:p>
           <a:p>
             <a:r>
-              <a:rPr lang="bg-BG" dirty="0" smtClean="0"/>
+              <a:rPr lang="bg-BG" dirty="0"/>
               <a:t>За да </a:t>
             </a:r>
             <a:r>
-              <a:rPr lang="bg-BG" b="1" dirty="0" smtClean="0"/>
+              <a:rPr lang="bg-BG" b="1" dirty="0"/>
               <a:t>оцветим фигура</a:t>
             </a:r>
             <a:r>
-              <a:rPr lang="bg-BG" dirty="0" smtClean="0"/>
+              <a:rPr lang="bg-BG" dirty="0"/>
               <a:t>, трябва да щракнем във </a:t>
             </a:r>
             <a:r>
-              <a:rPr lang="bg-BG" b="1" dirty="0" smtClean="0"/>
+              <a:rPr lang="bg-BG" b="1" dirty="0"/>
               <a:t>вътрешността</a:t>
             </a:r>
             <a:r>
-              <a:rPr lang="bg-BG" dirty="0" smtClean="0"/>
+              <a:rPr lang="bg-BG" dirty="0"/>
               <a:t> на обекта</a:t>
             </a:r>
           </a:p>
@@ -14376,7 +14225,7 @@
           <a:lstStyle/>
           <a:p>
             <a:r>
-              <a:rPr lang="bg-BG" dirty="0" smtClean="0"/>
+              <a:rPr lang="bg-BG" dirty="0"/>
               <a:t>Запълване с цвят</a:t>
             </a:r>
             <a:endParaRPr lang="en-US" dirty="0"/>
@@ -14643,15 +14492,15 @@
               <a:t>Инструментът </a:t>
             </a:r>
             <a:r>
+              <a:rPr lang="en-US" b="1" dirty="0">
+                <a:solidFill>
+                  <a:schemeClr val="bg1"/>
+                </a:solidFill>
+              </a:rPr>
+              <a:t>Color picker</a:t>
+            </a:r>
+            <a:r>
               <a:rPr lang="bg-BG" b="1" dirty="0">
-                <a:solidFill>
-                  <a:schemeClr val="bg1"/>
-                </a:solidFill>
-              </a:rPr>
-              <a:t>избор на цвят</a:t>
-            </a:r>
-            <a:r>
-              <a:rPr lang="bg-BG" dirty="0">
                 <a:solidFill>
                   <a:schemeClr val="bg1"/>
                 </a:solidFill>
@@ -14663,8 +14512,8 @@
               <a:t>(</a:t>
             </a:r>
             <a:r>
-              <a:rPr lang="en-US" b="1" dirty="0"/>
-              <a:t>Color picker</a:t>
+              <a:rPr lang="bg-BG" b="1" dirty="0"/>
+              <a:t>избор на цвят</a:t>
             </a:r>
             <a:r>
               <a:rPr lang="bg-BG" dirty="0"/>
@@ -14684,11 +14533,7 @@
             </a:r>
             <a:r>
               <a:rPr lang="ru-RU" b="1" dirty="0"/>
-              <a:t>съществуващо </a:t>
-            </a:r>
-            <a:r>
-              <a:rPr lang="ru-RU" b="1" dirty="0" smtClean="0"/>
-              <a:t>изображение</a:t>
+              <a:t>съществуващо изображение</a:t>
             </a:r>
           </a:p>
           <a:p>
@@ -14717,31 +14562,31 @@
           </a:p>
           <a:p>
             <a:r>
-              <a:rPr lang="bg-BG" dirty="0" smtClean="0"/>
+              <a:rPr lang="bg-BG" dirty="0"/>
               <a:t>За да </a:t>
             </a:r>
             <a:r>
-              <a:rPr lang="bg-BG" b="1" dirty="0" smtClean="0"/>
+              <a:rPr lang="bg-BG" b="1" dirty="0"/>
               <a:t>вземем</a:t>
             </a:r>
             <a:r>
-              <a:rPr lang="bg-BG" dirty="0" smtClean="0"/>
+              <a:rPr lang="bg-BG" dirty="0"/>
               <a:t> желания от нас </a:t>
             </a:r>
             <a:r>
-              <a:rPr lang="bg-BG" b="1" dirty="0" smtClean="0"/>
+              <a:rPr lang="bg-BG" b="1" dirty="0"/>
               <a:t>цвят</a:t>
             </a:r>
             <a:r>
-              <a:rPr lang="bg-BG" dirty="0" smtClean="0"/>
+              <a:rPr lang="bg-BG" dirty="0"/>
               <a:t>, трябва да </a:t>
             </a:r>
             <a:r>
-              <a:rPr lang="bg-BG" b="1" dirty="0" smtClean="0"/>
+              <a:rPr lang="bg-BG" b="1" dirty="0"/>
               <a:t>щракнем</a:t>
             </a:r>
             <a:r>
-              <a:rPr lang="bg-BG" dirty="0" smtClean="0"/>
+              <a:rPr lang="bg-BG" dirty="0"/>
               <a:t> върху него от рисунката</a:t>
             </a:r>
             <a:endParaRPr lang="en-US" b="1" dirty="0"/>
@@ -14764,7 +14609,7 @@
           <a:lstStyle/>
           <a:p>
             <a:r>
-              <a:rPr lang="bg-BG" dirty="0" smtClean="0"/>
+              <a:rPr lang="bg-BG" dirty="0"/>
               <a:t>Избор на цвят</a:t>
             </a:r>
             <a:endParaRPr lang="en-US" dirty="0"/>
@@ -15053,18 +14898,14 @@
           <a:p>
             <a:r>
               <a:rPr lang="bg-BG" dirty="0"/>
-              <a:t>Избор на </a:t>
-            </a:r>
-            <a:r>
-              <a:rPr lang="bg-BG" dirty="0" smtClean="0"/>
-              <a:t>цвят</a:t>
-            </a:r>
-            <a:r>
-              <a:rPr lang="en-US" dirty="0" smtClean="0"/>
+              <a:t>Избор на цвят</a:t>
+            </a:r>
+            <a:r>
+              <a:rPr lang="en-US" dirty="0"/>
               <a:t> – </a:t>
             </a:r>
             <a:r>
-              <a:rPr lang="bg-BG" dirty="0" smtClean="0"/>
+              <a:rPr lang="bg-BG" dirty="0"/>
               <a:t>видео</a:t>
             </a:r>
             <a:endParaRPr lang="en-US" dirty="0"/>
@@ -15093,8 +14934,8 @@
         </p:blipFill>
         <p:spPr>
           <a:xfrm>
-            <a:off x="2170501" y="1854000"/>
-            <a:ext cx="7850999" cy="4243620"/>
+            <a:off x="1268933" y="1359000"/>
+            <a:ext cx="9654134" cy="5218250"/>
           </a:xfrm>
           <a:prstGeom prst="rect">
             <a:avLst/>
@@ -15126,13 +14967,6 @@
       <p:transition spd="slow" advClick="0" advTm="5000"/>
     </mc:Fallback>
   </mc:AlternateContent>
-  <p:timing>
-    <p:tnLst>
-      <p:par>
-        <p:cTn id="1" dur="indefinite" restart="never" nodeType="tmRoot"/>
-      </p:par>
-    </p:tnLst>
-  </p:timing>
 </p:sld>
 </file>
 

</xml_diff>

<commit_message>
Updates on "12. Colour Palettes" slides
</commit_message>
<xml_diff>
--- a/Courses/Computer-Modeling-and-IT/Computer-Modeling-and-IT-5-Class/12-Colour-Palettes/12-Colour-Palettes.pptx
+++ b/Courses/Computer-Modeling-and-IT/Computer-Modeling-and-IT-5-Class/12-Colour-Palettes/12-Colour-Palettes.pptx
@@ -287,7 +287,7 @@
           <a:p>
             <a:fld id="{4E087215-0C8F-4762-A664-737A353EC9A4}" type="datetimeFigureOut">
               <a:rPr lang="bg-BG" smtClean="0"/>
-              <a:t>31.10.23 г.</a:t>
+              <a:t>13.01.24 г.</a:t>
             </a:fld>
             <a:endParaRPr lang="bg-BG"/>
           </a:p>
@@ -483,7 +483,7 @@
           <a:p>
             <a:fld id="{72D84649-876A-46C9-8472-14CB09C070D8}" type="datetimeFigureOut">
               <a:rPr lang="en-US" smtClean="0"/>
-              <a:t>10/31/23</a:t>
+              <a:t>1/13/24</a:t>
             </a:fld>
             <a:endParaRPr lang="en-US"/>
           </a:p>
@@ -4223,7 +4223,7 @@
             <a:fld id="{055373AC-9AA7-423B-BA00-BA1C74164DBD}" type="datetime1">
               <a:rPr lang="en-US" smtClean="0"/>
               <a:pPr/>
-              <a:t>10/31/23</a:t>
+              <a:t>1/13/24</a:t>
             </a:fld>
             <a:endParaRPr lang="en-US" dirty="0"/>
           </a:p>
@@ -9016,13 +9016,13 @@
         </p:nvSpPr>
         <p:spPr bwMode="auto">
           <a:xfrm>
-            <a:off x="3351000" y="5067750"/>
+            <a:off x="8481000" y="4859861"/>
             <a:ext cx="2925000" cy="1620000"/>
           </a:xfrm>
           <a:prstGeom prst="wedgeRoundRectCallout">
             <a:avLst>
-              <a:gd name="adj1" fmla="val 80115"/>
-              <a:gd name="adj2" fmla="val -38630"/>
+              <a:gd name="adj1" fmla="val -57504"/>
+              <a:gd name="adj2" fmla="val -31268"/>
               <a:gd name="adj3" fmla="val 16667"/>
             </a:avLst>
           </a:prstGeom>
@@ -9331,8 +9331,8 @@
           </a:xfrm>
           <a:prstGeom prst="wedgeRoundRectCallout">
             <a:avLst>
-              <a:gd name="adj1" fmla="val -47896"/>
-              <a:gd name="adj2" fmla="val 75656"/>
+              <a:gd name="adj1" fmla="val -49173"/>
+              <a:gd name="adj2" fmla="val 69450"/>
               <a:gd name="adj3" fmla="val 16667"/>
             </a:avLst>
           </a:prstGeom>
@@ -9822,8 +9822,8 @@
         </p:blipFill>
         <p:spPr>
           <a:xfrm>
-            <a:off x="3456297" y="2169000"/>
-            <a:ext cx="5028749" cy="3690000"/>
+            <a:off x="2876374" y="1629000"/>
+            <a:ext cx="6439252" cy="4725000"/>
           </a:xfrm>
           <a:prstGeom prst="rect">
             <a:avLst/>
@@ -9850,8 +9850,8 @@
           </a:xfrm>
           <a:prstGeom prst="wedgeRoundRectCallout">
             <a:avLst>
-              <a:gd name="adj1" fmla="val 50314"/>
-              <a:gd name="adj2" fmla="val 135429"/>
+              <a:gd name="adj1" fmla="val 53995"/>
+              <a:gd name="adj2" fmla="val 151994"/>
               <a:gd name="adj3" fmla="val 16667"/>
             </a:avLst>
           </a:prstGeom>
@@ -9912,6 +9912,21 @@
               <a:t>След като сте достигнали до желания цвят, натискате бутона </a:t>
             </a:r>
             <a:r>
+              <a:rPr lang="en-US" sz="2800" dirty="0">
+                <a:solidFill>
+                  <a:srgbClr val="FFFFFF"/>
+                </a:solidFill>
+                <a:effectLst>
+                  <a:outerShdw blurRad="38100" dist="38100" dir="2700000" algn="tl">
+                    <a:srgbClr val="000000">
+                      <a:alpha val="43137"/>
+                    </a:srgbClr>
+                  </a:outerShdw>
+                </a:effectLst>
+              </a:rPr>
+              <a:t>[</a:t>
+            </a:r>
+            <a:r>
               <a:rPr lang="en-US" sz="2800" b="1" dirty="0">
                 <a:solidFill>
                   <a:schemeClr val="bg1">
@@ -9928,6 +9943,21 @@
                 </a:effectLst>
               </a:rPr>
               <a:t>Add to Custom Colors</a:t>
+            </a:r>
+            <a:r>
+              <a:rPr lang="en-US" sz="2800" dirty="0">
+                <a:solidFill>
+                  <a:schemeClr val="bg2"/>
+                </a:solidFill>
+                <a:effectLst>
+                  <a:outerShdw blurRad="38100" dist="38100" dir="2700000" algn="tl">
+                    <a:srgbClr val="000000">
+                      <a:alpha val="43137"/>
+                    </a:srgbClr>
+                  </a:outerShdw>
+                </a:effectLst>
+              </a:rPr>
+              <a:t>]</a:t>
             </a:r>
             <a:r>
               <a:rPr lang="bg-BG" sz="2800" b="1" dirty="0">
@@ -10699,7 +10729,7 @@
         </p:nvSpPr>
         <p:spPr>
           <a:xfrm>
-            <a:off x="676648" y="1610812"/>
+            <a:off x="676648" y="1584000"/>
             <a:ext cx="11269351" cy="4894130"/>
           </a:xfrm>
           <a:prstGeom prst="rect">
@@ -10884,7 +10914,7 @@
               </a:buClr>
             </a:pPr>
             <a:r>
-              <a:rPr lang="en-US" sz="3200" b="1" dirty="0">
+              <a:rPr lang="en-US" sz="3600" b="1" dirty="0">
                 <a:solidFill>
                   <a:srgbClr val="FF0000"/>
                 </a:solidFill>
@@ -10892,7 +10922,7 @@
               <a:t>R</a:t>
             </a:r>
             <a:r>
-              <a:rPr lang="en-US" sz="3200" b="1" dirty="0">
+              <a:rPr lang="en-US" sz="3600" b="1" dirty="0">
                 <a:solidFill>
                   <a:schemeClr val="accent2"/>
                 </a:solidFill>
@@ -10900,7 +10930,7 @@
               <a:t>G</a:t>
             </a:r>
             <a:r>
-              <a:rPr lang="en-US" sz="3200" b="1" dirty="0">
+              <a:rPr lang="en-US" sz="3600" b="1" dirty="0">
                 <a:solidFill>
                   <a:schemeClr val="accent3"/>
                 </a:solidFill>
@@ -10908,7 +10938,7 @@
               <a:t>B</a:t>
             </a:r>
             <a:r>
-              <a:rPr lang="en-US" sz="3200" dirty="0">
+              <a:rPr lang="en-US" sz="3600" dirty="0">
                 <a:solidFill>
                   <a:schemeClr val="accent3"/>
                 </a:solidFill>
@@ -10916,7 +10946,7 @@
               <a:t> </a:t>
             </a:r>
             <a:r>
-              <a:rPr lang="bg-BG" sz="3200" b="1" dirty="0">
+              <a:rPr lang="bg-BG" sz="3600" b="1" dirty="0">
                 <a:solidFill>
                   <a:schemeClr val="bg2"/>
                 </a:solidFill>
@@ -10924,7 +10954,7 @@
               <a:t>модел </a:t>
             </a:r>
             <a:r>
-              <a:rPr lang="bg-BG" sz="3200" dirty="0">
+              <a:rPr lang="bg-BG" sz="3600" dirty="0">
                 <a:solidFill>
                   <a:schemeClr val="bg2"/>
                 </a:solidFill>
@@ -10932,7 +10962,7 @@
               <a:t>–</a:t>
             </a:r>
             <a:r>
-              <a:rPr lang="en-US" sz="3200" dirty="0">
+              <a:rPr lang="en-US" sz="3600" dirty="0">
                 <a:solidFill>
                   <a:schemeClr val="bg2"/>
                 </a:solidFill>
@@ -10940,7 +10970,7 @@
               <a:t> </a:t>
             </a:r>
             <a:r>
-              <a:rPr lang="bg-BG" sz="3200" b="1" dirty="0">
+              <a:rPr lang="bg-BG" sz="3600" b="1" dirty="0">
                 <a:solidFill>
                   <a:schemeClr val="bg2"/>
                 </a:solidFill>
@@ -10948,7 +10978,7 @@
               <a:t>създаване</a:t>
             </a:r>
             <a:r>
-              <a:rPr lang="bg-BG" sz="3200" dirty="0">
+              <a:rPr lang="bg-BG" sz="3600" dirty="0">
                 <a:solidFill>
                   <a:schemeClr val="bg2"/>
                 </a:solidFill>
@@ -10956,7 +10986,7 @@
               <a:t> на </a:t>
             </a:r>
             <a:r>
-              <a:rPr lang="bg-BG" sz="3200" b="1" dirty="0">
+              <a:rPr lang="bg-BG" sz="3600" b="1" dirty="0">
                 <a:solidFill>
                   <a:schemeClr val="bg2"/>
                 </a:solidFill>
@@ -10964,7 +10994,7 @@
               <a:t>цветове</a:t>
             </a:r>
             <a:r>
-              <a:rPr lang="bg-BG" sz="3200" dirty="0">
+              <a:rPr lang="bg-BG" sz="3600" dirty="0">
                 <a:solidFill>
                   <a:schemeClr val="bg2"/>
                 </a:solidFill>
@@ -10972,7 +11002,7 @@
               <a:t> чрез </a:t>
             </a:r>
             <a:r>
-              <a:rPr lang="bg-BG" sz="3200" b="1" dirty="0">
+              <a:rPr lang="bg-BG" sz="3600" b="1" dirty="0">
                 <a:solidFill>
                   <a:schemeClr val="bg2"/>
                 </a:solidFill>
@@ -10980,7 +11010,7 @@
               <a:t>комбиниране</a:t>
             </a:r>
             <a:r>
-              <a:rPr lang="bg-BG" sz="3200" dirty="0">
+              <a:rPr lang="bg-BG" sz="3600" dirty="0">
                 <a:solidFill>
                   <a:schemeClr val="bg2"/>
                 </a:solidFill>
@@ -10988,7 +11018,7 @@
               <a:t> на </a:t>
             </a:r>
             <a:r>
-              <a:rPr lang="bg-BG" sz="3200" b="1" dirty="0">
+              <a:rPr lang="bg-BG" sz="3600" b="1" dirty="0">
                 <a:solidFill>
                   <a:schemeClr val="bg2"/>
                 </a:solidFill>
@@ -10996,7 +11026,7 @@
               <a:t>трите</a:t>
             </a:r>
             <a:r>
-              <a:rPr lang="bg-BG" sz="3200" dirty="0">
+              <a:rPr lang="bg-BG" sz="3600" dirty="0">
                 <a:solidFill>
                   <a:schemeClr val="bg2"/>
                 </a:solidFill>
@@ -11004,7 +11034,7 @@
               <a:t> основни </a:t>
             </a:r>
             <a:r>
-              <a:rPr lang="bg-BG" sz="3200" b="1" dirty="0">
+              <a:rPr lang="bg-BG" sz="3600" b="1" dirty="0">
                 <a:solidFill>
                   <a:schemeClr val="bg2"/>
                 </a:solidFill>
@@ -11019,7 +11049,7 @@
               </a:buClr>
             </a:pPr>
             <a:r>
-              <a:rPr lang="bg-BG" sz="3200" dirty="0">
+              <a:rPr lang="bg-BG" sz="3600" dirty="0">
                 <a:solidFill>
                   <a:schemeClr val="bg2"/>
                 </a:solidFill>
@@ -11037,7 +11067,7 @@
               </a:buClr>
             </a:pPr>
             <a:r>
-              <a:rPr lang="bg-BG" sz="3000" b="1" dirty="0">
+              <a:rPr lang="bg-BG" sz="3400" b="1" dirty="0">
                 <a:solidFill>
                   <a:schemeClr val="bg1">
                     <a:lumMod val="60000"/>
@@ -11048,7 +11078,7 @@
               <a:t>Запълване с цвят</a:t>
             </a:r>
             <a:r>
-              <a:rPr lang="bg-BG" sz="3000" dirty="0">
+              <a:rPr lang="bg-BG" sz="3400" dirty="0">
                 <a:solidFill>
                   <a:schemeClr val="bg1">
                     <a:lumMod val="60000"/>
@@ -11059,7 +11089,7 @@
               <a:t> </a:t>
             </a:r>
             <a:r>
-              <a:rPr lang="bg-BG" sz="3000" dirty="0">
+              <a:rPr lang="bg-BG" sz="3400" dirty="0">
                 <a:solidFill>
                   <a:schemeClr val="bg2"/>
                 </a:solidFill>
@@ -11067,7 +11097,7 @@
               <a:t>– </a:t>
             </a:r>
             <a:r>
-              <a:rPr lang="bg-BG" sz="3000" b="1" dirty="0">
+              <a:rPr lang="bg-BG" sz="3400" b="1" dirty="0">
                 <a:solidFill>
                   <a:schemeClr val="bg2"/>
                 </a:solidFill>
@@ -11085,7 +11115,7 @@
               </a:buClr>
             </a:pPr>
             <a:r>
-              <a:rPr lang="bg-BG" sz="2800" b="1" dirty="0">
+              <a:rPr lang="bg-BG" sz="3400" b="1" dirty="0">
                 <a:solidFill>
                   <a:schemeClr val="bg1">
                     <a:lumMod val="60000"/>
@@ -11096,7 +11126,7 @@
               <a:t>Избор на цвят</a:t>
             </a:r>
             <a:r>
-              <a:rPr lang="bg-BG" sz="2800" dirty="0">
+              <a:rPr lang="bg-BG" sz="3400" dirty="0">
                 <a:solidFill>
                   <a:schemeClr val="bg1">
                     <a:lumMod val="60000"/>
@@ -11107,7 +11137,7 @@
               <a:t> </a:t>
             </a:r>
             <a:r>
-              <a:rPr lang="bg-BG" sz="2800" dirty="0">
+              <a:rPr lang="bg-BG" sz="3400" dirty="0">
                 <a:solidFill>
                   <a:schemeClr val="bg2"/>
                 </a:solidFill>
@@ -11115,7 +11145,7 @@
               <a:t>– </a:t>
             </a:r>
             <a:r>
-              <a:rPr lang="ru-RU" sz="2800" dirty="0">
+              <a:rPr lang="ru-RU" sz="3400" dirty="0">
                 <a:solidFill>
                   <a:schemeClr val="bg2"/>
                 </a:solidFill>
@@ -11123,7 +11153,7 @@
               <a:t>потребителите да избират конкретни</a:t>
             </a:r>
             <a:r>
-              <a:rPr lang="ru-RU" sz="2800" b="1" dirty="0">
+              <a:rPr lang="ru-RU" sz="3400" b="1" dirty="0">
                 <a:solidFill>
                   <a:schemeClr val="bg2"/>
                 </a:solidFill>
@@ -11131,7 +11161,7 @@
               <a:t> цветове </a:t>
             </a:r>
             <a:r>
-              <a:rPr lang="ru-RU" sz="2800" dirty="0">
+              <a:rPr lang="ru-RU" sz="3400" dirty="0">
                 <a:solidFill>
                   <a:schemeClr val="bg2"/>
                 </a:solidFill>
@@ -11139,7 +11169,7 @@
               <a:t>от вече </a:t>
             </a:r>
             <a:r>
-              <a:rPr lang="ru-RU" sz="2800" b="1" dirty="0">
+              <a:rPr lang="ru-RU" sz="3400" b="1" dirty="0">
                 <a:solidFill>
                   <a:schemeClr val="bg2"/>
                 </a:solidFill>
@@ -11154,7 +11184,7 @@
               </a:buClr>
             </a:pPr>
             <a:r>
-              <a:rPr lang="bg-BG" sz="3200" b="1" dirty="0">
+              <a:rPr lang="bg-BG" sz="3600" b="1" dirty="0">
                 <a:solidFill>
                   <a:schemeClr val="bg2"/>
                 </a:solidFill>
@@ -11162,7 +11192,7 @@
               <a:t>Създаване</a:t>
             </a:r>
             <a:r>
-              <a:rPr lang="bg-BG" sz="3200" dirty="0">
+              <a:rPr lang="bg-BG" sz="3600" dirty="0">
                 <a:solidFill>
                   <a:schemeClr val="bg2"/>
                 </a:solidFill>
@@ -11170,7 +11200,7 @@
               <a:t> на </a:t>
             </a:r>
             <a:r>
-              <a:rPr lang="bg-BG" sz="3200" b="1" dirty="0">
+              <a:rPr lang="bg-BG" sz="3600" b="1" dirty="0">
                 <a:solidFill>
                   <a:schemeClr val="bg1">
                     <a:lumMod val="60000"/>
@@ -11180,37 +11210,7 @@
               </a:rPr>
               <a:t>собствен цвят</a:t>
             </a:r>
-            <a:endParaRPr lang="ru-RU" sz="2600" dirty="0">
-              <a:solidFill>
-                <a:schemeClr val="bg2"/>
-              </a:solidFill>
-            </a:endParaRPr>
-          </a:p>
-          <a:p>
-            <a:pPr marL="381049">
-              <a:spcAft>
-                <a:spcPts val="1200"/>
-              </a:spcAft>
-              <a:buClr>
-                <a:schemeClr val="bg2"/>
-              </a:buClr>
-            </a:pPr>
-            <a:endParaRPr lang="bg-BG" sz="2800" dirty="0">
-              <a:solidFill>
-                <a:schemeClr val="bg2"/>
-              </a:solidFill>
-            </a:endParaRPr>
-          </a:p>
-          <a:p>
-            <a:pPr marL="381049">
-              <a:spcAft>
-                <a:spcPts val="1200"/>
-              </a:spcAft>
-              <a:buClr>
-                <a:schemeClr val="bg2"/>
-              </a:buClr>
-            </a:pPr>
-            <a:endParaRPr lang="bg-BG" sz="2800" dirty="0">
+            <a:endParaRPr lang="ru-RU" sz="2800" dirty="0">
               <a:solidFill>
                 <a:schemeClr val="bg2"/>
               </a:solidFill>
@@ -11287,33 +11287,15 @@
                                   </p:childTnLst>
                                 </p:cTn>
                               </p:par>
-                            </p:childTnLst>
-                          </p:cTn>
-                        </p:par>
-                      </p:childTnLst>
-                    </p:cTn>
-                  </p:par>
-                  <p:par>
-                    <p:cTn id="7" fill="hold">
-                      <p:stCondLst>
-                        <p:cond delay="indefinite"/>
-                      </p:stCondLst>
-                      <p:childTnLst>
-                        <p:par>
-                          <p:cTn id="8" fill="hold">
-                            <p:stCondLst>
-                              <p:cond delay="0"/>
-                            </p:stCondLst>
-                            <p:childTnLst>
                               <p:par>
-                                <p:cTn id="9" presetID="1" presetClass="entr" presetSubtype="0" fill="hold" nodeType="clickEffect">
+                                <p:cTn id="7" presetID="1" presetClass="entr" presetSubtype="0" fill="hold" nodeType="withEffect">
                                   <p:stCondLst>
                                     <p:cond delay="0"/>
                                   </p:stCondLst>
                                   <p:childTnLst>
                                     <p:set>
                                       <p:cBhvr>
-                                        <p:cTn id="10" dur="1" fill="hold">
+                                        <p:cTn id="8" dur="1" fill="hold">
                                           <p:stCondLst>
                                             <p:cond delay="0"/>
                                           </p:stCondLst>
@@ -11343,26 +11325,26 @@
                     </p:cTn>
                   </p:par>
                   <p:par>
-                    <p:cTn id="11" fill="hold">
+                    <p:cTn id="9" fill="hold">
                       <p:stCondLst>
                         <p:cond delay="indefinite"/>
                       </p:stCondLst>
                       <p:childTnLst>
                         <p:par>
-                          <p:cTn id="12" fill="hold">
+                          <p:cTn id="10" fill="hold">
                             <p:stCondLst>
                               <p:cond delay="0"/>
                             </p:stCondLst>
                             <p:childTnLst>
                               <p:par>
-                                <p:cTn id="13" presetID="1" presetClass="entr" presetSubtype="0" fill="hold" nodeType="clickEffect">
+                                <p:cTn id="11" presetID="1" presetClass="entr" presetSubtype="0" fill="hold" nodeType="clickEffect">
                                   <p:stCondLst>
                                     <p:cond delay="0"/>
                                   </p:stCondLst>
                                   <p:childTnLst>
                                     <p:set>
                                       <p:cBhvr>
-                                        <p:cTn id="14" dur="1" fill="hold">
+                                        <p:cTn id="12" dur="1" fill="hold">
                                           <p:stCondLst>
                                             <p:cond delay="0"/>
                                           </p:stCondLst>
@@ -11392,26 +11374,26 @@
                     </p:cTn>
                   </p:par>
                   <p:par>
-                    <p:cTn id="15" fill="hold">
+                    <p:cTn id="13" fill="hold">
                       <p:stCondLst>
                         <p:cond delay="indefinite"/>
                       </p:stCondLst>
                       <p:childTnLst>
                         <p:par>
-                          <p:cTn id="16" fill="hold">
+                          <p:cTn id="14" fill="hold">
                             <p:stCondLst>
                               <p:cond delay="0"/>
                             </p:stCondLst>
                             <p:childTnLst>
                               <p:par>
-                                <p:cTn id="17" presetID="1" presetClass="entr" presetSubtype="0" fill="hold" nodeType="clickEffect">
+                                <p:cTn id="15" presetID="1" presetClass="entr" presetSubtype="0" fill="hold" nodeType="clickEffect">
                                   <p:stCondLst>
                                     <p:cond delay="0"/>
                                   </p:stCondLst>
                                   <p:childTnLst>
                                     <p:set>
                                       <p:cBhvr>
-                                        <p:cTn id="18" dur="1" fill="hold">
+                                        <p:cTn id="16" dur="1" fill="hold">
                                           <p:stCondLst>
                                             <p:cond delay="0"/>
                                           </p:stCondLst>

</xml_diff>